<commit_message>
change some scripts and updated README.md
</commit_message>
<xml_diff>
--- a/section_1/powerpoint_lectures/CDS-SR scRNA-seq workshop_Introduction to scRNA-seq.pptx
+++ b/section_1/powerpoint_lectures/CDS-SR scRNA-seq workshop_Introduction to scRNA-seq.pptx
@@ -247,7 +247,7 @@
           <a:p>
             <a:fld id="{0DB201D4-5C30-4229-BF19-216A20C8E312}" type="datetimeFigureOut">
               <a:rPr lang="en-US" smtClean="0"/>
-              <a:t>4/17/2022</a:t>
+              <a:t>4/18/2022</a:t>
             </a:fld>
             <a:endParaRPr lang="en-US"/>
           </a:p>
@@ -1040,7 +1040,7 @@
           <a:p>
             <a:fld id="{FCEFA0E7-925F-4EB3-8109-83A3EB738777}" type="datetimeFigureOut">
               <a:rPr lang="en-US" smtClean="0"/>
-              <a:t>4/17/2022</a:t>
+              <a:t>4/18/2022</a:t>
             </a:fld>
             <a:endParaRPr lang="en-US"/>
           </a:p>
@@ -1238,7 +1238,7 @@
           <a:p>
             <a:fld id="{FCEFA0E7-925F-4EB3-8109-83A3EB738777}" type="datetimeFigureOut">
               <a:rPr lang="en-US" smtClean="0"/>
-              <a:t>4/17/2022</a:t>
+              <a:t>4/18/2022</a:t>
             </a:fld>
             <a:endParaRPr lang="en-US"/>
           </a:p>
@@ -1446,7 +1446,7 @@
           <a:p>
             <a:fld id="{FCEFA0E7-925F-4EB3-8109-83A3EB738777}" type="datetimeFigureOut">
               <a:rPr lang="en-US" smtClean="0"/>
-              <a:t>4/17/2022</a:t>
+              <a:t>4/18/2022</a:t>
             </a:fld>
             <a:endParaRPr lang="en-US"/>
           </a:p>
@@ -1644,7 +1644,7 @@
           <a:p>
             <a:fld id="{FCEFA0E7-925F-4EB3-8109-83A3EB738777}" type="datetimeFigureOut">
               <a:rPr lang="en-US" smtClean="0"/>
-              <a:t>4/17/2022</a:t>
+              <a:t>4/18/2022</a:t>
             </a:fld>
             <a:endParaRPr lang="en-US"/>
           </a:p>
@@ -1919,7 +1919,7 @@
           <a:p>
             <a:fld id="{FCEFA0E7-925F-4EB3-8109-83A3EB738777}" type="datetimeFigureOut">
               <a:rPr lang="en-US" smtClean="0"/>
-              <a:t>4/17/2022</a:t>
+              <a:t>4/18/2022</a:t>
             </a:fld>
             <a:endParaRPr lang="en-US"/>
           </a:p>
@@ -2184,7 +2184,7 @@
           <a:p>
             <a:fld id="{FCEFA0E7-925F-4EB3-8109-83A3EB738777}" type="datetimeFigureOut">
               <a:rPr lang="en-US" smtClean="0"/>
-              <a:t>4/17/2022</a:t>
+              <a:t>4/18/2022</a:t>
             </a:fld>
             <a:endParaRPr lang="en-US"/>
           </a:p>
@@ -2596,7 +2596,7 @@
           <a:p>
             <a:fld id="{FCEFA0E7-925F-4EB3-8109-83A3EB738777}" type="datetimeFigureOut">
               <a:rPr lang="en-US" smtClean="0"/>
-              <a:t>4/17/2022</a:t>
+              <a:t>4/18/2022</a:t>
             </a:fld>
             <a:endParaRPr lang="en-US"/>
           </a:p>
@@ -2737,7 +2737,7 @@
           <a:p>
             <a:fld id="{FCEFA0E7-925F-4EB3-8109-83A3EB738777}" type="datetimeFigureOut">
               <a:rPr lang="en-US" smtClean="0"/>
-              <a:t>4/17/2022</a:t>
+              <a:t>4/18/2022</a:t>
             </a:fld>
             <a:endParaRPr lang="en-US"/>
           </a:p>
@@ -2850,7 +2850,7 @@
           <a:p>
             <a:fld id="{FCEFA0E7-925F-4EB3-8109-83A3EB738777}" type="datetimeFigureOut">
               <a:rPr lang="en-US" smtClean="0"/>
-              <a:t>4/17/2022</a:t>
+              <a:t>4/18/2022</a:t>
             </a:fld>
             <a:endParaRPr lang="en-US"/>
           </a:p>
@@ -3161,7 +3161,7 @@
           <a:p>
             <a:fld id="{FCEFA0E7-925F-4EB3-8109-83A3EB738777}" type="datetimeFigureOut">
               <a:rPr lang="en-US" smtClean="0"/>
-              <a:t>4/17/2022</a:t>
+              <a:t>4/18/2022</a:t>
             </a:fld>
             <a:endParaRPr lang="en-US"/>
           </a:p>
@@ -3449,7 +3449,7 @@
           <a:p>
             <a:fld id="{FCEFA0E7-925F-4EB3-8109-83A3EB738777}" type="datetimeFigureOut">
               <a:rPr lang="en-US" smtClean="0"/>
-              <a:t>4/17/2022</a:t>
+              <a:t>4/18/2022</a:t>
             </a:fld>
             <a:endParaRPr lang="en-US"/>
           </a:p>
@@ -3690,7 +3690,7 @@
           <a:p>
             <a:fld id="{FCEFA0E7-925F-4EB3-8109-83A3EB738777}" type="datetimeFigureOut">
               <a:rPr lang="en-US" smtClean="0"/>
-              <a:t>4/17/2022</a:t>
+              <a:t>4/18/2022</a:t>
             </a:fld>
             <a:endParaRPr lang="en-US"/>
           </a:p>

</xml_diff>